<commit_message>
Fixed bug in EvoAgent
ActionSequencer now correctly returns either the score or the negative score depending on the player id
</commit_message>
<xml_diff>
--- a/doc/slides/Simple Planet Wars/Simple Planet Wars Overview.pptx
+++ b/doc/slides/Simple Planet Wars/Simple Planet Wars Overview.pptx
@@ -3601,10 +3601,16 @@
               <a:t>–</a:t>
             </a:r>
             <a:r>
-              <a:rPr lang="en-US" smtClean="0"/>
+              <a:rPr lang="en-US" dirty="0" smtClean="0"/>
               <a:t> speed at which it moves</a:t>
             </a:r>
-            <a:endParaRPr lang="en-US" dirty="0" smtClean="0"/>
+          </a:p>
+          <a:p>
+            <a:pPr lvl="1"/>
+            <a:r>
+              <a:rPr lang="en-US" dirty="0" smtClean="0"/>
+              <a:t>Note: the moving buffer idea is an added twist (no pun intended)</a:t>
+            </a:r>
           </a:p>
         </p:txBody>
       </p:sp>

</xml_diff>